<commit_message>
Added user flow diagrma and system layer architecture diagram
</commit_message>
<xml_diff>
--- a/FYP proposal V1/ArchitecutreDesign.pptx
+++ b/FYP proposal V1/ArchitecutreDesign.pptx
@@ -105,7 +105,16 @@
       </a:defRPr>
     </a:lvl9pPr>
   </p:defaultTextStyle>
+  <p:extLst>
+    <p:ext uri="{EFAFB233-063F-42B5-8137-9DF3F51BA10A}">
+      <p15:sldGuideLst xmlns:p15="http://schemas.microsoft.com/office/powerpoint/2012/main"/>
+    </p:ext>
+  </p:extLst>
 </p:presentation>
+</file>
+
+<file path=ppt/revisionInfo.xml><?xml version="1.0" encoding="utf-8"?>
+<p1510:revInfo xmlns:a="http://schemas.openxmlformats.org/drawingml/2006/main" xmlns:r="http://schemas.openxmlformats.org/officeDocument/2006/relationships" xmlns:p1510="http://schemas.microsoft.com/office/powerpoint/2015/10/main"/>
 </file>
 
 <file path=ppt/slideLayouts/slideLayout1.xml><?xml version="1.0" encoding="utf-8"?>
@@ -257,7 +266,7 @@
           <a:p>
             <a:fld id="{C3D0D60F-B766-4A36-A20F-B89224CDE8BF}" type="datetimeFigureOut">
               <a:rPr lang="en-SG" smtClean="0"/>
-              <a:t>22/8/2017</a:t>
+              <a:t>23/8/2017</a:t>
             </a:fld>
             <a:endParaRPr lang="en-SG"/>
           </a:p>
@@ -457,7 +466,7 @@
           <a:p>
             <a:fld id="{C3D0D60F-B766-4A36-A20F-B89224CDE8BF}" type="datetimeFigureOut">
               <a:rPr lang="en-SG" smtClean="0"/>
-              <a:t>22/8/2017</a:t>
+              <a:t>23/8/2017</a:t>
             </a:fld>
             <a:endParaRPr lang="en-SG"/>
           </a:p>
@@ -667,7 +676,7 @@
           <a:p>
             <a:fld id="{C3D0D60F-B766-4A36-A20F-B89224CDE8BF}" type="datetimeFigureOut">
               <a:rPr lang="en-SG" smtClean="0"/>
-              <a:t>22/8/2017</a:t>
+              <a:t>23/8/2017</a:t>
             </a:fld>
             <a:endParaRPr lang="en-SG"/>
           </a:p>
@@ -867,7 +876,7 @@
           <a:p>
             <a:fld id="{C3D0D60F-B766-4A36-A20F-B89224CDE8BF}" type="datetimeFigureOut">
               <a:rPr lang="en-SG" smtClean="0"/>
-              <a:t>22/8/2017</a:t>
+              <a:t>23/8/2017</a:t>
             </a:fld>
             <a:endParaRPr lang="en-SG"/>
           </a:p>
@@ -1143,7 +1152,7 @@
           <a:p>
             <a:fld id="{C3D0D60F-B766-4A36-A20F-B89224CDE8BF}" type="datetimeFigureOut">
               <a:rPr lang="en-SG" smtClean="0"/>
-              <a:t>22/8/2017</a:t>
+              <a:t>23/8/2017</a:t>
             </a:fld>
             <a:endParaRPr lang="en-SG"/>
           </a:p>
@@ -1411,7 +1420,7 @@
           <a:p>
             <a:fld id="{C3D0D60F-B766-4A36-A20F-B89224CDE8BF}" type="datetimeFigureOut">
               <a:rPr lang="en-SG" smtClean="0"/>
-              <a:t>22/8/2017</a:t>
+              <a:t>23/8/2017</a:t>
             </a:fld>
             <a:endParaRPr lang="en-SG"/>
           </a:p>
@@ -1826,7 +1835,7 @@
           <a:p>
             <a:fld id="{C3D0D60F-B766-4A36-A20F-B89224CDE8BF}" type="datetimeFigureOut">
               <a:rPr lang="en-SG" smtClean="0"/>
-              <a:t>22/8/2017</a:t>
+              <a:t>23/8/2017</a:t>
             </a:fld>
             <a:endParaRPr lang="en-SG"/>
           </a:p>
@@ -1968,7 +1977,7 @@
           <a:p>
             <a:fld id="{C3D0D60F-B766-4A36-A20F-B89224CDE8BF}" type="datetimeFigureOut">
               <a:rPr lang="en-SG" smtClean="0"/>
-              <a:t>22/8/2017</a:t>
+              <a:t>23/8/2017</a:t>
             </a:fld>
             <a:endParaRPr lang="en-SG"/>
           </a:p>
@@ -2081,7 +2090,7 @@
           <a:p>
             <a:fld id="{C3D0D60F-B766-4A36-A20F-B89224CDE8BF}" type="datetimeFigureOut">
               <a:rPr lang="en-SG" smtClean="0"/>
-              <a:t>22/8/2017</a:t>
+              <a:t>23/8/2017</a:t>
             </a:fld>
             <a:endParaRPr lang="en-SG"/>
           </a:p>
@@ -2394,7 +2403,7 @@
           <a:p>
             <a:fld id="{C3D0D60F-B766-4A36-A20F-B89224CDE8BF}" type="datetimeFigureOut">
               <a:rPr lang="en-SG" smtClean="0"/>
-              <a:t>22/8/2017</a:t>
+              <a:t>23/8/2017</a:t>
             </a:fld>
             <a:endParaRPr lang="en-SG"/>
           </a:p>
@@ -2683,7 +2692,7 @@
           <a:p>
             <a:fld id="{C3D0D60F-B766-4A36-A20F-B89224CDE8BF}" type="datetimeFigureOut">
               <a:rPr lang="en-SG" smtClean="0"/>
-              <a:t>22/8/2017</a:t>
+              <a:t>23/8/2017</a:t>
             </a:fld>
             <a:endParaRPr lang="en-SG"/>
           </a:p>
@@ -2926,7 +2935,7 @@
           <a:p>
             <a:fld id="{C3D0D60F-B766-4A36-A20F-B89224CDE8BF}" type="datetimeFigureOut">
               <a:rPr lang="en-SG" smtClean="0"/>
-              <a:t>22/8/2017</a:t>
+              <a:t>23/8/2017</a:t>
             </a:fld>
             <a:endParaRPr lang="en-SG"/>
           </a:p>
@@ -3460,796 +3469,817 @@
           <a:chExt cx="0" cy="0"/>
         </a:xfrm>
       </p:grpSpPr>
-      <p:sp>
-        <p:nvSpPr>
-          <p:cNvPr id="4" name="Rectangle 3">
-            <a:extLst>
-              <a:ext uri="{FF2B5EF4-FFF2-40B4-BE49-F238E27FC236}">
-                <a16:creationId xmlns:a16="http://schemas.microsoft.com/office/drawing/2014/main" id="{F911828D-18D4-4A9A-8AF1-02D203125E21}"/>
-              </a:ext>
-            </a:extLst>
-          </p:cNvPr>
-          <p:cNvSpPr/>
+      <p:grpSp>
+        <p:nvGrpSpPr>
+          <p:cNvPr id="2" name="Group 1">
+            <a:extLst>
+              <a:ext uri="{FF2B5EF4-FFF2-40B4-BE49-F238E27FC236}">
+                <a16:creationId xmlns:a16="http://schemas.microsoft.com/office/drawing/2014/main" id="{8B39EF87-29F3-49C9-B988-26B29A74C484}"/>
+              </a:ext>
+            </a:extLst>
+          </p:cNvPr>
+          <p:cNvGrpSpPr/>
           <p:nvPr/>
-        </p:nvSpPr>
-        <p:spPr>
+        </p:nvGrpSpPr>
+        <p:grpSpPr>
           <a:xfrm>
-            <a:off x="277060" y="1066800"/>
-            <a:ext cx="1919677" cy="4737462"/>
+            <a:off x="-127582" y="121920"/>
+            <a:ext cx="10650157" cy="6278880"/>
+            <a:chOff x="-127582" y="121920"/>
+            <a:chExt cx="10650157" cy="6278880"/>
           </a:xfrm>
-          <a:prstGeom prst="rect">
-            <a:avLst/>
-          </a:prstGeom>
-        </p:spPr>
-        <p:style>
-          <a:lnRef idx="2">
-            <a:schemeClr val="accent2">
-              <a:shade val="50000"/>
-            </a:schemeClr>
-          </a:lnRef>
-          <a:fillRef idx="1">
-            <a:schemeClr val="accent2"/>
-          </a:fillRef>
-          <a:effectRef idx="0">
-            <a:schemeClr val="accent2"/>
-          </a:effectRef>
-          <a:fontRef idx="minor">
-            <a:schemeClr val="lt1"/>
-          </a:fontRef>
-        </p:style>
-        <p:txBody>
-          <a:bodyPr rtlCol="0" anchor="ctr"/>
-          <a:lstStyle/>
-          <a:p>
-            <a:pPr algn="ctr"/>
-            <a:endParaRPr lang="en-SG" b="1" i="1" dirty="0"/>
-          </a:p>
-          <a:p>
-            <a:pPr marL="285750" indent="-285750">
-              <a:buFont typeface="Arial" panose="020B0604020202020204" pitchFamily="34" charset="0"/>
-              <a:buChar char="•"/>
-            </a:pPr>
-            <a:r>
-              <a:rPr lang="en-SG" dirty="0"/>
-              <a:t>XML documents defining the UI </a:t>
-            </a:r>
-          </a:p>
-          <a:p>
-            <a:pPr marL="285750" indent="-285750">
-              <a:buFont typeface="Arial" panose="020B0604020202020204" pitchFamily="34" charset="0"/>
-              <a:buChar char="•"/>
-            </a:pPr>
-            <a:r>
-              <a:rPr lang="en-SG" dirty="0"/>
-              <a:t>ACTIVITIES that load the UI</a:t>
-            </a:r>
-          </a:p>
-        </p:txBody>
-      </p:sp>
-      <p:sp>
-        <p:nvSpPr>
-          <p:cNvPr id="5" name="Rectangle 4">
-            <a:extLst>
-              <a:ext uri="{FF2B5EF4-FFF2-40B4-BE49-F238E27FC236}">
-                <a16:creationId xmlns:a16="http://schemas.microsoft.com/office/drawing/2014/main" id="{F4C9ECEE-3CEF-4AE7-B9BA-1F285273D55B}"/>
-              </a:ext>
-            </a:extLst>
-          </p:cNvPr>
-          <p:cNvSpPr/>
-          <p:nvPr/>
-        </p:nvSpPr>
-        <p:spPr>
-          <a:xfrm>
-            <a:off x="3990702" y="1097280"/>
-            <a:ext cx="2079172" cy="4737462"/>
-          </a:xfrm>
-          <a:prstGeom prst="rect">
-            <a:avLst/>
-          </a:prstGeom>
-        </p:spPr>
-        <p:style>
-          <a:lnRef idx="2">
-            <a:schemeClr val="accent1">
-              <a:shade val="50000"/>
-            </a:schemeClr>
-          </a:lnRef>
-          <a:fillRef idx="1">
-            <a:schemeClr val="accent1"/>
-          </a:fillRef>
-          <a:effectRef idx="0">
-            <a:schemeClr val="accent1"/>
-          </a:effectRef>
-          <a:fontRef idx="minor">
-            <a:schemeClr val="lt1"/>
-          </a:fontRef>
-        </p:style>
-        <p:txBody>
-          <a:bodyPr rtlCol="0" anchor="ctr"/>
-          <a:lstStyle/>
-          <a:p>
-            <a:pPr marL="285750" indent="-285750">
-              <a:buFont typeface="Arial" panose="020B0604020202020204" pitchFamily="34" charset="0"/>
-              <a:buChar char="•"/>
-            </a:pPr>
-            <a:r>
-              <a:rPr lang="en-SG" dirty="0"/>
-              <a:t>&lt;interface&gt; classes</a:t>
-            </a:r>
-          </a:p>
-          <a:p>
-            <a:pPr marL="285750" indent="-285750">
-              <a:buFont typeface="Arial" panose="020B0604020202020204" pitchFamily="34" charset="0"/>
-              <a:buChar char="•"/>
-            </a:pPr>
-            <a:r>
-              <a:rPr lang="en-SG" dirty="0"/>
-              <a:t>Interface implementations </a:t>
-            </a:r>
-          </a:p>
-        </p:txBody>
-      </p:sp>
-      <p:sp>
-        <p:nvSpPr>
-          <p:cNvPr id="6" name="Rectangle 5">
-            <a:extLst>
-              <a:ext uri="{FF2B5EF4-FFF2-40B4-BE49-F238E27FC236}">
-                <a16:creationId xmlns:a16="http://schemas.microsoft.com/office/drawing/2014/main" id="{2DA80EBF-FE5B-4FEB-A406-18406DF3CA83}"/>
-              </a:ext>
-            </a:extLst>
-          </p:cNvPr>
-          <p:cNvSpPr/>
-          <p:nvPr/>
-        </p:nvSpPr>
-        <p:spPr>
-          <a:xfrm>
-            <a:off x="8078535" y="1097280"/>
-            <a:ext cx="2101341" cy="2002971"/>
-          </a:xfrm>
-          <a:prstGeom prst="rect">
-            <a:avLst/>
-          </a:prstGeom>
-        </p:spPr>
-        <p:style>
-          <a:lnRef idx="2">
-            <a:schemeClr val="accent1">
-              <a:shade val="50000"/>
-            </a:schemeClr>
-          </a:lnRef>
-          <a:fillRef idx="1">
-            <a:schemeClr val="accent1"/>
-          </a:fillRef>
-          <a:effectRef idx="0">
-            <a:schemeClr val="accent1"/>
-          </a:effectRef>
-          <a:fontRef idx="minor">
-            <a:schemeClr val="lt1"/>
-          </a:fontRef>
-        </p:style>
-        <p:txBody>
-          <a:bodyPr rtlCol="0" anchor="ctr"/>
-          <a:lstStyle/>
-          <a:p>
-            <a:pPr algn="ctr"/>
-            <a:r>
-              <a:rPr lang="en-SG" dirty="0"/>
-              <a:t>SQLite</a:t>
-            </a:r>
-          </a:p>
-          <a:p>
-            <a:pPr algn="ctr"/>
-            <a:r>
-              <a:rPr lang="en-SG" dirty="0"/>
-              <a:t>DATABASE</a:t>
-            </a:r>
-          </a:p>
-        </p:txBody>
-      </p:sp>
-      <p:sp>
-        <p:nvSpPr>
-          <p:cNvPr id="7" name="Rectangle 6">
-            <a:extLst>
-              <a:ext uri="{FF2B5EF4-FFF2-40B4-BE49-F238E27FC236}">
-                <a16:creationId xmlns:a16="http://schemas.microsoft.com/office/drawing/2014/main" id="{4BD83E6D-0417-4C0F-BC4B-91A79C023F64}"/>
-              </a:ext>
-            </a:extLst>
-          </p:cNvPr>
-          <p:cNvSpPr/>
-          <p:nvPr/>
-        </p:nvSpPr>
-        <p:spPr>
-          <a:xfrm>
-            <a:off x="8078534" y="3496228"/>
-            <a:ext cx="2101341" cy="2279814"/>
-          </a:xfrm>
-          <a:prstGeom prst="rect">
-            <a:avLst/>
-          </a:prstGeom>
-        </p:spPr>
-        <p:style>
-          <a:lnRef idx="2">
-            <a:schemeClr val="accent1">
-              <a:shade val="50000"/>
-            </a:schemeClr>
-          </a:lnRef>
-          <a:fillRef idx="1">
-            <a:schemeClr val="accent1"/>
-          </a:fillRef>
-          <a:effectRef idx="0">
-            <a:schemeClr val="accent1"/>
-          </a:effectRef>
-          <a:fontRef idx="minor">
-            <a:schemeClr val="lt1"/>
-          </a:fontRef>
-        </p:style>
-        <p:txBody>
-          <a:bodyPr rtlCol="0" anchor="ctr"/>
-          <a:lstStyle/>
-          <a:p>
-            <a:pPr algn="ctr"/>
-            <a:endParaRPr lang="en-SG" dirty="0"/>
-          </a:p>
-          <a:p>
-            <a:pPr algn="ctr"/>
-            <a:r>
-              <a:rPr lang="en-SG" dirty="0"/>
-              <a:t>AWS CLOUD</a:t>
-            </a:r>
-          </a:p>
-          <a:p>
-            <a:pPr algn="ctr"/>
-            <a:r>
-              <a:rPr lang="en-SG" dirty="0"/>
-              <a:t>SERVICE</a:t>
-            </a:r>
-          </a:p>
-        </p:txBody>
-      </p:sp>
-      <p:cxnSp>
-        <p:nvCxnSpPr>
-          <p:cNvPr id="13" name="Straight Arrow Connector 12">
-            <a:extLst>
-              <a:ext uri="{FF2B5EF4-FFF2-40B4-BE49-F238E27FC236}">
-                <a16:creationId xmlns:a16="http://schemas.microsoft.com/office/drawing/2014/main" id="{AC888022-C2EB-44AC-99FF-FCFD7902E88A}"/>
-              </a:ext>
-            </a:extLst>
-          </p:cNvPr>
-          <p:cNvCxnSpPr>
-            <a:cxnSpLocks/>
-          </p:cNvCxnSpPr>
-          <p:nvPr/>
-        </p:nvCxnSpPr>
-        <p:spPr>
-          <a:xfrm>
-            <a:off x="2196737" y="2029097"/>
-            <a:ext cx="1793965" cy="0"/>
-          </a:xfrm>
-          <a:prstGeom prst="straightConnector1">
-            <a:avLst/>
-          </a:prstGeom>
-          <a:ln>
-            <a:tailEnd type="triangle"/>
-          </a:ln>
-        </p:spPr>
-        <p:style>
-          <a:lnRef idx="2">
-            <a:schemeClr val="dk1"/>
-          </a:lnRef>
-          <a:fillRef idx="0">
-            <a:schemeClr val="dk1"/>
-          </a:fillRef>
-          <a:effectRef idx="1">
-            <a:schemeClr val="dk1"/>
-          </a:effectRef>
-          <a:fontRef idx="minor">
-            <a:schemeClr val="tx1"/>
-          </a:fontRef>
-        </p:style>
-      </p:cxnSp>
-      <p:cxnSp>
-        <p:nvCxnSpPr>
-          <p:cNvPr id="15" name="Straight Arrow Connector 14">
-            <a:extLst>
-              <a:ext uri="{FF2B5EF4-FFF2-40B4-BE49-F238E27FC236}">
-                <a16:creationId xmlns:a16="http://schemas.microsoft.com/office/drawing/2014/main" id="{4999A313-FBF5-43EC-B335-A1E7AA777D3C}"/>
-              </a:ext>
-            </a:extLst>
-          </p:cNvPr>
-          <p:cNvCxnSpPr>
-            <a:cxnSpLocks/>
-          </p:cNvCxnSpPr>
-          <p:nvPr/>
-        </p:nvCxnSpPr>
-        <p:spPr>
-          <a:xfrm flipH="1">
-            <a:off x="2196738" y="4450080"/>
-            <a:ext cx="1793964" cy="0"/>
-          </a:xfrm>
-          <a:prstGeom prst="straightConnector1">
-            <a:avLst/>
-          </a:prstGeom>
-          <a:ln>
-            <a:tailEnd type="triangle"/>
-          </a:ln>
-        </p:spPr>
-        <p:style>
-          <a:lnRef idx="2">
-            <a:schemeClr val="dk1"/>
-          </a:lnRef>
-          <a:fillRef idx="0">
-            <a:schemeClr val="dk1"/>
-          </a:fillRef>
-          <a:effectRef idx="1">
-            <a:schemeClr val="dk1"/>
-          </a:effectRef>
-          <a:fontRef idx="minor">
-            <a:schemeClr val="tx1"/>
-          </a:fontRef>
-        </p:style>
-      </p:cxnSp>
-      <p:cxnSp>
-        <p:nvCxnSpPr>
-          <p:cNvPr id="17" name="Straight Arrow Connector 16">
-            <a:extLst>
-              <a:ext uri="{FF2B5EF4-FFF2-40B4-BE49-F238E27FC236}">
-                <a16:creationId xmlns:a16="http://schemas.microsoft.com/office/drawing/2014/main" id="{639D8E23-45C4-49F3-B3B0-957B2D74268B}"/>
-              </a:ext>
-            </a:extLst>
-          </p:cNvPr>
-          <p:cNvCxnSpPr>
-            <a:cxnSpLocks/>
-            <a:stCxn id="5" idx="3"/>
-            <a:endCxn id="6" idx="1"/>
-          </p:cNvCxnSpPr>
-          <p:nvPr/>
-        </p:nvCxnSpPr>
-        <p:spPr>
-          <a:xfrm flipV="1">
-            <a:off x="6069874" y="2098766"/>
-            <a:ext cx="2008661" cy="1367245"/>
-          </a:xfrm>
-          <a:prstGeom prst="straightConnector1">
-            <a:avLst/>
-          </a:prstGeom>
-          <a:ln w="9525" cap="flat" cmpd="sng" algn="ctr">
-            <a:solidFill>
+        </p:grpSpPr>
+        <p:sp>
+          <p:nvSpPr>
+            <p:cNvPr id="4" name="Rectangle 3">
+              <a:extLst>
+                <a:ext uri="{FF2B5EF4-FFF2-40B4-BE49-F238E27FC236}">
+                  <a16:creationId xmlns:a16="http://schemas.microsoft.com/office/drawing/2014/main" id="{F911828D-18D4-4A9A-8AF1-02D203125E21}"/>
+                </a:ext>
+              </a:extLst>
+            </p:cNvPr>
+            <p:cNvSpPr/>
+            <p:nvPr/>
+          </p:nvSpPr>
+          <p:spPr>
+            <a:xfrm>
+              <a:off x="277060" y="1066800"/>
+              <a:ext cx="1919677" cy="4737462"/>
+            </a:xfrm>
+            <a:prstGeom prst="rect">
+              <a:avLst/>
+            </a:prstGeom>
+          </p:spPr>
+          <p:style>
+            <a:lnRef idx="2">
+              <a:schemeClr val="accent2">
+                <a:shade val="50000"/>
+              </a:schemeClr>
+            </a:lnRef>
+            <a:fillRef idx="1">
+              <a:schemeClr val="accent2"/>
+            </a:fillRef>
+            <a:effectRef idx="0">
+              <a:schemeClr val="accent2"/>
+            </a:effectRef>
+            <a:fontRef idx="minor">
+              <a:schemeClr val="lt1"/>
+            </a:fontRef>
+          </p:style>
+          <p:txBody>
+            <a:bodyPr rtlCol="0" anchor="ctr"/>
+            <a:lstStyle/>
+            <a:p>
+              <a:pPr algn="ctr"/>
+              <a:endParaRPr lang="en-SG" b="1" i="1" dirty="0"/>
+            </a:p>
+            <a:p>
+              <a:pPr marL="285750" indent="-285750">
+                <a:buFont typeface="Arial" panose="020B0604020202020204" pitchFamily="34" charset="0"/>
+                <a:buChar char="•"/>
+              </a:pPr>
+              <a:r>
+                <a:rPr lang="en-SG" dirty="0"/>
+                <a:t>XML documents defining the UI </a:t>
+              </a:r>
+            </a:p>
+            <a:p>
+              <a:pPr marL="285750" indent="-285750">
+                <a:buFont typeface="Arial" panose="020B0604020202020204" pitchFamily="34" charset="0"/>
+                <a:buChar char="•"/>
+              </a:pPr>
+              <a:r>
+                <a:rPr lang="en-SG" dirty="0"/>
+                <a:t>ACTIVITIES that load the UI</a:t>
+              </a:r>
+            </a:p>
+          </p:txBody>
+        </p:sp>
+        <p:sp>
+          <p:nvSpPr>
+            <p:cNvPr id="5" name="Rectangle 4">
+              <a:extLst>
+                <a:ext uri="{FF2B5EF4-FFF2-40B4-BE49-F238E27FC236}">
+                  <a16:creationId xmlns:a16="http://schemas.microsoft.com/office/drawing/2014/main" id="{F4C9ECEE-3CEF-4AE7-B9BA-1F285273D55B}"/>
+                </a:ext>
+              </a:extLst>
+            </p:cNvPr>
+            <p:cNvSpPr/>
+            <p:nvPr/>
+          </p:nvSpPr>
+          <p:spPr>
+            <a:xfrm>
+              <a:off x="3990702" y="1097280"/>
+              <a:ext cx="2079172" cy="4737462"/>
+            </a:xfrm>
+            <a:prstGeom prst="rect">
+              <a:avLst/>
+            </a:prstGeom>
+          </p:spPr>
+          <p:style>
+            <a:lnRef idx="2">
+              <a:schemeClr val="accent1">
+                <a:shade val="50000"/>
+              </a:schemeClr>
+            </a:lnRef>
+            <a:fillRef idx="1">
+              <a:schemeClr val="accent1"/>
+            </a:fillRef>
+            <a:effectRef idx="0">
+              <a:schemeClr val="accent1"/>
+            </a:effectRef>
+            <a:fontRef idx="minor">
+              <a:schemeClr val="lt1"/>
+            </a:fontRef>
+          </p:style>
+          <p:txBody>
+            <a:bodyPr rtlCol="0" anchor="ctr"/>
+            <a:lstStyle/>
+            <a:p>
+              <a:pPr marL="285750" indent="-285750">
+                <a:buFont typeface="Arial" panose="020B0604020202020204" pitchFamily="34" charset="0"/>
+                <a:buChar char="•"/>
+              </a:pPr>
+              <a:r>
+                <a:rPr lang="en-SG" dirty="0"/>
+                <a:t>&lt;interface&gt; classes</a:t>
+              </a:r>
+            </a:p>
+            <a:p>
+              <a:pPr marL="285750" indent="-285750">
+                <a:buFont typeface="Arial" panose="020B0604020202020204" pitchFamily="34" charset="0"/>
+                <a:buChar char="•"/>
+              </a:pPr>
+              <a:r>
+                <a:rPr lang="en-SG" dirty="0"/>
+                <a:t>Interface implementations </a:t>
+              </a:r>
+            </a:p>
+          </p:txBody>
+        </p:sp>
+        <p:sp>
+          <p:nvSpPr>
+            <p:cNvPr id="6" name="Rectangle 5">
+              <a:extLst>
+                <a:ext uri="{FF2B5EF4-FFF2-40B4-BE49-F238E27FC236}">
+                  <a16:creationId xmlns:a16="http://schemas.microsoft.com/office/drawing/2014/main" id="{2DA80EBF-FE5B-4FEB-A406-18406DF3CA83}"/>
+                </a:ext>
+              </a:extLst>
+            </p:cNvPr>
+            <p:cNvSpPr/>
+            <p:nvPr/>
+          </p:nvSpPr>
+          <p:spPr>
+            <a:xfrm>
+              <a:off x="8078535" y="1097280"/>
+              <a:ext cx="2101341" cy="2002971"/>
+            </a:xfrm>
+            <a:prstGeom prst="rect">
+              <a:avLst/>
+            </a:prstGeom>
+          </p:spPr>
+          <p:style>
+            <a:lnRef idx="2">
+              <a:schemeClr val="accent1">
+                <a:shade val="50000"/>
+              </a:schemeClr>
+            </a:lnRef>
+            <a:fillRef idx="1">
+              <a:schemeClr val="accent1"/>
+            </a:fillRef>
+            <a:effectRef idx="0">
+              <a:schemeClr val="accent1"/>
+            </a:effectRef>
+            <a:fontRef idx="minor">
+              <a:schemeClr val="lt1"/>
+            </a:fontRef>
+          </p:style>
+          <p:txBody>
+            <a:bodyPr rtlCol="0" anchor="ctr"/>
+            <a:lstStyle/>
+            <a:p>
+              <a:pPr algn="ctr"/>
+              <a:r>
+                <a:rPr lang="en-SG" dirty="0"/>
+                <a:t>SQLite</a:t>
+              </a:r>
+            </a:p>
+            <a:p>
+              <a:pPr algn="ctr"/>
+              <a:r>
+                <a:rPr lang="en-SG" dirty="0"/>
+                <a:t>DATABASE</a:t>
+              </a:r>
+            </a:p>
+          </p:txBody>
+        </p:sp>
+        <p:sp>
+          <p:nvSpPr>
+            <p:cNvPr id="7" name="Rectangle 6">
+              <a:extLst>
+                <a:ext uri="{FF2B5EF4-FFF2-40B4-BE49-F238E27FC236}">
+                  <a16:creationId xmlns:a16="http://schemas.microsoft.com/office/drawing/2014/main" id="{4BD83E6D-0417-4C0F-BC4B-91A79C023F64}"/>
+                </a:ext>
+              </a:extLst>
+            </p:cNvPr>
+            <p:cNvSpPr/>
+            <p:nvPr/>
+          </p:nvSpPr>
+          <p:spPr>
+            <a:xfrm>
+              <a:off x="8078534" y="3496228"/>
+              <a:ext cx="2101341" cy="2279814"/>
+            </a:xfrm>
+            <a:prstGeom prst="rect">
+              <a:avLst/>
+            </a:prstGeom>
+          </p:spPr>
+          <p:style>
+            <a:lnRef idx="2">
+              <a:schemeClr val="accent1">
+                <a:shade val="50000"/>
+              </a:schemeClr>
+            </a:lnRef>
+            <a:fillRef idx="1">
+              <a:schemeClr val="accent1"/>
+            </a:fillRef>
+            <a:effectRef idx="0">
+              <a:schemeClr val="accent1"/>
+            </a:effectRef>
+            <a:fontRef idx="minor">
+              <a:schemeClr val="lt1"/>
+            </a:fontRef>
+          </p:style>
+          <p:txBody>
+            <a:bodyPr rtlCol="0" anchor="ctr"/>
+            <a:lstStyle/>
+            <a:p>
+              <a:pPr algn="ctr"/>
+              <a:endParaRPr lang="en-SG" dirty="0"/>
+            </a:p>
+            <a:p>
+              <a:pPr algn="ctr"/>
+              <a:r>
+                <a:rPr lang="en-SG" dirty="0"/>
+                <a:t>AWS CLOUD</a:t>
+              </a:r>
+            </a:p>
+            <a:p>
+              <a:pPr algn="ctr"/>
+              <a:r>
+                <a:rPr lang="en-SG" dirty="0"/>
+                <a:t>SERVICE</a:t>
+              </a:r>
+            </a:p>
+          </p:txBody>
+        </p:sp>
+        <p:cxnSp>
+          <p:nvCxnSpPr>
+            <p:cNvPr id="13" name="Straight Arrow Connector 12">
+              <a:extLst>
+                <a:ext uri="{FF2B5EF4-FFF2-40B4-BE49-F238E27FC236}">
+                  <a16:creationId xmlns:a16="http://schemas.microsoft.com/office/drawing/2014/main" id="{AC888022-C2EB-44AC-99FF-FCFD7902E88A}"/>
+                </a:ext>
+              </a:extLst>
+            </p:cNvPr>
+            <p:cNvCxnSpPr>
+              <a:cxnSpLocks/>
+            </p:cNvCxnSpPr>
+            <p:nvPr/>
+          </p:nvCxnSpPr>
+          <p:spPr>
+            <a:xfrm>
+              <a:off x="2196737" y="2029097"/>
+              <a:ext cx="1793965" cy="0"/>
+            </a:xfrm>
+            <a:prstGeom prst="straightConnector1">
+              <a:avLst/>
+            </a:prstGeom>
+            <a:ln>
+              <a:tailEnd type="triangle"/>
+            </a:ln>
+          </p:spPr>
+          <p:style>
+            <a:lnRef idx="2">
               <a:schemeClr val="dk1"/>
-            </a:solidFill>
-            <a:prstDash val="solid"/>
-            <a:round/>
-            <a:headEnd type="arrow" w="med" len="med"/>
-            <a:tailEnd type="arrow" w="med" len="med"/>
-          </a:ln>
-        </p:spPr>
-        <p:style>
-          <a:lnRef idx="0">
-            <a:scrgbClr r="0" g="0" b="0"/>
-          </a:lnRef>
-          <a:fillRef idx="0">
-            <a:scrgbClr r="0" g="0" b="0"/>
-          </a:fillRef>
-          <a:effectRef idx="0">
-            <a:scrgbClr r="0" g="0" b="0"/>
-          </a:effectRef>
-          <a:fontRef idx="minor">
-            <a:schemeClr val="tx1"/>
-          </a:fontRef>
-        </p:style>
-      </p:cxnSp>
-      <p:cxnSp>
-        <p:nvCxnSpPr>
-          <p:cNvPr id="18" name="Straight Arrow Connector 17">
-            <a:extLst>
-              <a:ext uri="{FF2B5EF4-FFF2-40B4-BE49-F238E27FC236}">
-                <a16:creationId xmlns:a16="http://schemas.microsoft.com/office/drawing/2014/main" id="{6D54B009-9F23-416B-A9D2-47F32FDD1B54}"/>
-              </a:ext>
-            </a:extLst>
-          </p:cNvPr>
-          <p:cNvCxnSpPr>
-            <a:cxnSpLocks/>
-            <a:stCxn id="5" idx="3"/>
-            <a:endCxn id="7" idx="1"/>
-          </p:cNvCxnSpPr>
-          <p:nvPr/>
-        </p:nvCxnSpPr>
-        <p:spPr>
-          <a:xfrm>
-            <a:off x="6069874" y="3466011"/>
-            <a:ext cx="2008660" cy="1170124"/>
-          </a:xfrm>
-          <a:prstGeom prst="straightConnector1">
-            <a:avLst/>
-          </a:prstGeom>
-          <a:ln w="9525" cap="flat" cmpd="sng" algn="ctr">
-            <a:solidFill>
+            </a:lnRef>
+            <a:fillRef idx="0">
               <a:schemeClr val="dk1"/>
-            </a:solidFill>
-            <a:prstDash val="solid"/>
-            <a:round/>
-            <a:headEnd type="arrow" w="med" len="med"/>
-            <a:tailEnd type="arrow" w="med" len="med"/>
-          </a:ln>
-        </p:spPr>
-        <p:style>
-          <a:lnRef idx="0">
-            <a:scrgbClr r="0" g="0" b="0"/>
-          </a:lnRef>
-          <a:fillRef idx="0">
-            <a:scrgbClr r="0" g="0" b="0"/>
-          </a:fillRef>
-          <a:effectRef idx="0">
-            <a:scrgbClr r="0" g="0" b="0"/>
-          </a:effectRef>
-          <a:fontRef idx="minor">
-            <a:schemeClr val="tx1"/>
-          </a:fontRef>
-        </p:style>
-      </p:cxnSp>
-      <p:cxnSp>
-        <p:nvCxnSpPr>
-          <p:cNvPr id="24" name="Straight Connector 23">
-            <a:extLst>
-              <a:ext uri="{FF2B5EF4-FFF2-40B4-BE49-F238E27FC236}">
-                <a16:creationId xmlns:a16="http://schemas.microsoft.com/office/drawing/2014/main" id="{1663A26A-1FCF-4662-81D8-08A0BE68E008}"/>
-              </a:ext>
-            </a:extLst>
-          </p:cNvPr>
-          <p:cNvCxnSpPr>
-            <a:cxnSpLocks/>
-          </p:cNvCxnSpPr>
-          <p:nvPr/>
-        </p:nvCxnSpPr>
-        <p:spPr>
-          <a:xfrm>
-            <a:off x="3143794" y="121920"/>
-            <a:ext cx="0" cy="6278880"/>
-          </a:xfrm>
-          <a:prstGeom prst="line">
-            <a:avLst/>
-          </a:prstGeom>
-          <a:ln w="9525" cap="flat" cmpd="sng" algn="ctr">
-            <a:solidFill>
+            </a:fillRef>
+            <a:effectRef idx="1">
               <a:schemeClr val="dk1"/>
-            </a:solidFill>
-            <a:prstDash val="dash"/>
-            <a:round/>
-            <a:headEnd type="none" w="med" len="med"/>
-            <a:tailEnd type="none" w="med" len="med"/>
-          </a:ln>
-        </p:spPr>
-        <p:style>
-          <a:lnRef idx="0">
-            <a:scrgbClr r="0" g="0" b="0"/>
-          </a:lnRef>
-          <a:fillRef idx="0">
-            <a:scrgbClr r="0" g="0" b="0"/>
-          </a:fillRef>
-          <a:effectRef idx="0">
-            <a:scrgbClr r="0" g="0" b="0"/>
-          </a:effectRef>
-          <a:fontRef idx="minor">
-            <a:schemeClr val="tx1"/>
-          </a:fontRef>
-        </p:style>
-      </p:cxnSp>
-      <p:cxnSp>
-        <p:nvCxnSpPr>
-          <p:cNvPr id="26" name="Straight Connector 25">
-            <a:extLst>
-              <a:ext uri="{FF2B5EF4-FFF2-40B4-BE49-F238E27FC236}">
-                <a16:creationId xmlns:a16="http://schemas.microsoft.com/office/drawing/2014/main" id="{565D7042-DA60-41C1-9A48-E9F470F1DA42}"/>
-              </a:ext>
-            </a:extLst>
-          </p:cNvPr>
-          <p:cNvCxnSpPr>
-            <a:cxnSpLocks/>
-          </p:cNvCxnSpPr>
-          <p:nvPr/>
-        </p:nvCxnSpPr>
-        <p:spPr>
-          <a:xfrm>
-            <a:off x="6457405" y="121920"/>
-            <a:ext cx="0" cy="6278880"/>
-          </a:xfrm>
-          <a:prstGeom prst="line">
-            <a:avLst/>
-          </a:prstGeom>
-          <a:ln w="9525" cap="flat" cmpd="sng" algn="ctr">
-            <a:solidFill>
+            </a:effectRef>
+            <a:fontRef idx="minor">
+              <a:schemeClr val="tx1"/>
+            </a:fontRef>
+          </p:style>
+        </p:cxnSp>
+        <p:cxnSp>
+          <p:nvCxnSpPr>
+            <p:cNvPr id="15" name="Straight Arrow Connector 14">
+              <a:extLst>
+                <a:ext uri="{FF2B5EF4-FFF2-40B4-BE49-F238E27FC236}">
+                  <a16:creationId xmlns:a16="http://schemas.microsoft.com/office/drawing/2014/main" id="{4999A313-FBF5-43EC-B335-A1E7AA777D3C}"/>
+                </a:ext>
+              </a:extLst>
+            </p:cNvPr>
+            <p:cNvCxnSpPr>
+              <a:cxnSpLocks/>
+            </p:cNvCxnSpPr>
+            <p:nvPr/>
+          </p:nvCxnSpPr>
+          <p:spPr>
+            <a:xfrm flipH="1">
+              <a:off x="2196738" y="4450080"/>
+              <a:ext cx="1793964" cy="0"/>
+            </a:xfrm>
+            <a:prstGeom prst="straightConnector1">
+              <a:avLst/>
+            </a:prstGeom>
+            <a:ln>
+              <a:tailEnd type="triangle"/>
+            </a:ln>
+          </p:spPr>
+          <p:style>
+            <a:lnRef idx="2">
               <a:schemeClr val="dk1"/>
-            </a:solidFill>
-            <a:prstDash val="dash"/>
-            <a:round/>
-            <a:headEnd type="none" w="med" len="med"/>
-            <a:tailEnd type="none" w="med" len="med"/>
-          </a:ln>
-        </p:spPr>
-        <p:style>
-          <a:lnRef idx="0">
-            <a:scrgbClr r="0" g="0" b="0"/>
-          </a:lnRef>
-          <a:fillRef idx="0">
-            <a:scrgbClr r="0" g="0" b="0"/>
-          </a:fillRef>
-          <a:effectRef idx="0">
-            <a:scrgbClr r="0" g="0" b="0"/>
-          </a:effectRef>
-          <a:fontRef idx="minor">
-            <a:schemeClr val="tx1"/>
-          </a:fontRef>
-        </p:style>
-      </p:cxnSp>
-      <p:sp>
-        <p:nvSpPr>
-          <p:cNvPr id="33" name="TextBox 32">
-            <a:extLst>
-              <a:ext uri="{FF2B5EF4-FFF2-40B4-BE49-F238E27FC236}">
-                <a16:creationId xmlns:a16="http://schemas.microsoft.com/office/drawing/2014/main" id="{86D5140F-F427-42FA-8DAF-7F9ED8F7ACF3}"/>
-              </a:ext>
-            </a:extLst>
-          </p:cNvPr>
-          <p:cNvSpPr txBox="1"/>
-          <p:nvPr/>
-        </p:nvSpPr>
-        <p:spPr>
-          <a:xfrm>
-            <a:off x="2367117" y="1689851"/>
-            <a:ext cx="734047" cy="369332"/>
-          </a:xfrm>
-          <a:prstGeom prst="rect">
-            <a:avLst/>
-          </a:prstGeom>
-          <a:noFill/>
-        </p:spPr>
-        <p:txBody>
-          <a:bodyPr wrap="none" rtlCol="0">
-            <a:spAutoFit/>
-          </a:bodyPr>
-          <a:lstStyle/>
-          <a:p>
-            <a:r>
-              <a:rPr lang="en-SG" dirty="0"/>
-              <a:t>notify</a:t>
-            </a:r>
-          </a:p>
-        </p:txBody>
-      </p:sp>
-      <p:sp>
-        <p:nvSpPr>
-          <p:cNvPr id="34" name="TextBox 33">
-            <a:extLst>
-              <a:ext uri="{FF2B5EF4-FFF2-40B4-BE49-F238E27FC236}">
-                <a16:creationId xmlns:a16="http://schemas.microsoft.com/office/drawing/2014/main" id="{D00E449B-041E-4734-B80F-652E137208C0}"/>
-              </a:ext>
-            </a:extLst>
-          </p:cNvPr>
-          <p:cNvSpPr txBox="1"/>
-          <p:nvPr/>
-        </p:nvSpPr>
-        <p:spPr>
-          <a:xfrm>
-            <a:off x="2294538" y="4525327"/>
-            <a:ext cx="1727845" cy="584775"/>
-          </a:xfrm>
-          <a:prstGeom prst="rect">
-            <a:avLst/>
-          </a:prstGeom>
-          <a:noFill/>
-        </p:spPr>
-        <p:txBody>
-          <a:bodyPr wrap="none" rtlCol="0">
-            <a:spAutoFit/>
-          </a:bodyPr>
-          <a:lstStyle/>
-          <a:p>
-            <a:r>
-              <a:rPr lang="en-SG" sz="1600" dirty="0"/>
-              <a:t>Inform the view to</a:t>
-            </a:r>
-          </a:p>
-          <a:p>
-            <a:r>
-              <a:rPr lang="en-SG" sz="1600" dirty="0"/>
-              <a:t>Update itself</a:t>
-            </a:r>
-          </a:p>
-        </p:txBody>
-      </p:sp>
-      <p:sp>
-        <p:nvSpPr>
-          <p:cNvPr id="35" name="TextBox 34">
-            <a:extLst>
-              <a:ext uri="{FF2B5EF4-FFF2-40B4-BE49-F238E27FC236}">
-                <a16:creationId xmlns:a16="http://schemas.microsoft.com/office/drawing/2014/main" id="{18F19869-2A9C-4717-8A76-3FB2C4206C2F}"/>
-              </a:ext>
-            </a:extLst>
-          </p:cNvPr>
-          <p:cNvSpPr txBox="1"/>
-          <p:nvPr/>
-        </p:nvSpPr>
-        <p:spPr>
-          <a:xfrm rot="19576140">
-            <a:off x="5953390" y="2453606"/>
-            <a:ext cx="1950855" cy="307777"/>
-          </a:xfrm>
-          <a:prstGeom prst="rect">
-            <a:avLst/>
-          </a:prstGeom>
-          <a:noFill/>
-        </p:spPr>
-        <p:txBody>
-          <a:bodyPr wrap="none" rtlCol="0">
-            <a:spAutoFit/>
-          </a:bodyPr>
-          <a:lstStyle/>
-          <a:p>
-            <a:r>
-              <a:rPr lang="en-SG" sz="1400" dirty="0"/>
-              <a:t>Get data from database</a:t>
-            </a:r>
-          </a:p>
-        </p:txBody>
-      </p:sp>
-      <p:sp>
-        <p:nvSpPr>
-          <p:cNvPr id="37" name="TextBox 36">
-            <a:extLst>
-              <a:ext uri="{FF2B5EF4-FFF2-40B4-BE49-F238E27FC236}">
-                <a16:creationId xmlns:a16="http://schemas.microsoft.com/office/drawing/2014/main" id="{63738976-B3EC-4BB8-957A-741709D5A77E}"/>
-              </a:ext>
-            </a:extLst>
-          </p:cNvPr>
-          <p:cNvSpPr txBox="1"/>
-          <p:nvPr/>
-        </p:nvSpPr>
-        <p:spPr>
-          <a:xfrm rot="1691562">
-            <a:off x="6135360" y="4124585"/>
-            <a:ext cx="2177532" cy="307777"/>
-          </a:xfrm>
-          <a:prstGeom prst="rect">
-            <a:avLst/>
-          </a:prstGeom>
-          <a:noFill/>
-        </p:spPr>
-        <p:txBody>
-          <a:bodyPr wrap="square" rtlCol="0">
-            <a:spAutoFit/>
-          </a:bodyPr>
-          <a:lstStyle/>
-          <a:p>
-            <a:r>
-              <a:rPr lang="en-SG" sz="1400" dirty="0"/>
-              <a:t>Request AWS services</a:t>
-            </a:r>
-          </a:p>
-        </p:txBody>
-      </p:sp>
-      <p:sp>
-        <p:nvSpPr>
-          <p:cNvPr id="38" name="TextBox 37">
-            <a:extLst>
-              <a:ext uri="{FF2B5EF4-FFF2-40B4-BE49-F238E27FC236}">
-                <a16:creationId xmlns:a16="http://schemas.microsoft.com/office/drawing/2014/main" id="{0230E602-5228-4828-A820-F48DD7A09802}"/>
-              </a:ext>
-            </a:extLst>
-          </p:cNvPr>
-          <p:cNvSpPr txBox="1"/>
-          <p:nvPr/>
-        </p:nvSpPr>
-        <p:spPr>
-          <a:xfrm>
-            <a:off x="-127582" y="293264"/>
-            <a:ext cx="2786742" cy="584775"/>
-          </a:xfrm>
-          <a:prstGeom prst="rect">
-            <a:avLst/>
-          </a:prstGeom>
-          <a:noFill/>
-        </p:spPr>
-        <p:txBody>
-          <a:bodyPr wrap="square" rtlCol="0">
-            <a:spAutoFit/>
-          </a:bodyPr>
-          <a:lstStyle/>
-          <a:p>
-            <a:pPr algn="ctr"/>
-            <a:r>
-              <a:rPr lang="en-SG" sz="3200" b="1" i="1" dirty="0">
-                <a:solidFill>
-                  <a:schemeClr val="accent1">
-                    <a:lumMod val="75000"/>
-                  </a:schemeClr>
-                </a:solidFill>
-              </a:rPr>
-              <a:t>VIEW</a:t>
-            </a:r>
-          </a:p>
-        </p:txBody>
-      </p:sp>
-      <p:sp>
-        <p:nvSpPr>
-          <p:cNvPr id="39" name="TextBox 38">
-            <a:extLst>
-              <a:ext uri="{FF2B5EF4-FFF2-40B4-BE49-F238E27FC236}">
-                <a16:creationId xmlns:a16="http://schemas.microsoft.com/office/drawing/2014/main" id="{D3D6B3D0-AF6C-4637-B876-550D6DE85E19}"/>
-              </a:ext>
-            </a:extLst>
-          </p:cNvPr>
-          <p:cNvSpPr txBox="1"/>
-          <p:nvPr/>
-        </p:nvSpPr>
-        <p:spPr>
-          <a:xfrm>
-            <a:off x="3476898" y="278415"/>
-            <a:ext cx="2786742" cy="584775"/>
-          </a:xfrm>
-          <a:prstGeom prst="rect">
-            <a:avLst/>
-          </a:prstGeom>
-          <a:noFill/>
-        </p:spPr>
-        <p:txBody>
-          <a:bodyPr wrap="square" rtlCol="0">
-            <a:spAutoFit/>
-          </a:bodyPr>
-          <a:lstStyle/>
-          <a:p>
-            <a:pPr algn="ctr"/>
-            <a:r>
-              <a:rPr lang="en-SG" sz="3200" b="1" i="1" dirty="0">
-                <a:solidFill>
-                  <a:schemeClr val="accent1">
-                    <a:lumMod val="75000"/>
-                  </a:schemeClr>
-                </a:solidFill>
-              </a:rPr>
-              <a:t>PRECENTER</a:t>
-            </a:r>
-          </a:p>
-        </p:txBody>
-      </p:sp>
-      <p:sp>
-        <p:nvSpPr>
-          <p:cNvPr id="40" name="TextBox 39">
-            <a:extLst>
-              <a:ext uri="{FF2B5EF4-FFF2-40B4-BE49-F238E27FC236}">
-                <a16:creationId xmlns:a16="http://schemas.microsoft.com/office/drawing/2014/main" id="{4BC604E0-D03B-4595-8FAB-956F52EDC186}"/>
-              </a:ext>
-            </a:extLst>
-          </p:cNvPr>
-          <p:cNvSpPr txBox="1"/>
-          <p:nvPr/>
-        </p:nvSpPr>
-        <p:spPr>
-          <a:xfrm>
-            <a:off x="7735833" y="278415"/>
-            <a:ext cx="2786742" cy="584775"/>
-          </a:xfrm>
-          <a:prstGeom prst="rect">
-            <a:avLst/>
-          </a:prstGeom>
-          <a:noFill/>
-        </p:spPr>
-        <p:txBody>
-          <a:bodyPr wrap="square" rtlCol="0">
-            <a:spAutoFit/>
-          </a:bodyPr>
-          <a:lstStyle/>
-          <a:p>
-            <a:pPr algn="ctr"/>
-            <a:r>
-              <a:rPr lang="en-SG" sz="3200" b="1" i="1" dirty="0">
-                <a:solidFill>
-                  <a:schemeClr val="accent1">
-                    <a:lumMod val="75000"/>
-                  </a:schemeClr>
-                </a:solidFill>
-              </a:rPr>
-              <a:t>MODEL</a:t>
-            </a:r>
-          </a:p>
-        </p:txBody>
-      </p:sp>
+            </a:lnRef>
+            <a:fillRef idx="0">
+              <a:schemeClr val="dk1"/>
+            </a:fillRef>
+            <a:effectRef idx="1">
+              <a:schemeClr val="dk1"/>
+            </a:effectRef>
+            <a:fontRef idx="minor">
+              <a:schemeClr val="tx1"/>
+            </a:fontRef>
+          </p:style>
+        </p:cxnSp>
+        <p:cxnSp>
+          <p:nvCxnSpPr>
+            <p:cNvPr id="17" name="Straight Arrow Connector 16">
+              <a:extLst>
+                <a:ext uri="{FF2B5EF4-FFF2-40B4-BE49-F238E27FC236}">
+                  <a16:creationId xmlns:a16="http://schemas.microsoft.com/office/drawing/2014/main" id="{639D8E23-45C4-49F3-B3B0-957B2D74268B}"/>
+                </a:ext>
+              </a:extLst>
+            </p:cNvPr>
+            <p:cNvCxnSpPr>
+              <a:cxnSpLocks/>
+              <a:stCxn id="5" idx="3"/>
+              <a:endCxn id="6" idx="1"/>
+            </p:cNvCxnSpPr>
+            <p:nvPr/>
+          </p:nvCxnSpPr>
+          <p:spPr>
+            <a:xfrm flipV="1">
+              <a:off x="6069874" y="2098766"/>
+              <a:ext cx="2008661" cy="1367245"/>
+            </a:xfrm>
+            <a:prstGeom prst="straightConnector1">
+              <a:avLst/>
+            </a:prstGeom>
+            <a:ln w="9525" cap="flat" cmpd="sng" algn="ctr">
+              <a:solidFill>
+                <a:schemeClr val="dk1"/>
+              </a:solidFill>
+              <a:prstDash val="solid"/>
+              <a:round/>
+              <a:headEnd type="arrow" w="med" len="med"/>
+              <a:tailEnd type="arrow" w="med" len="med"/>
+            </a:ln>
+          </p:spPr>
+          <p:style>
+            <a:lnRef idx="0">
+              <a:scrgbClr r="0" g="0" b="0"/>
+            </a:lnRef>
+            <a:fillRef idx="0">
+              <a:scrgbClr r="0" g="0" b="0"/>
+            </a:fillRef>
+            <a:effectRef idx="0">
+              <a:scrgbClr r="0" g="0" b="0"/>
+            </a:effectRef>
+            <a:fontRef idx="minor">
+              <a:schemeClr val="tx1"/>
+            </a:fontRef>
+          </p:style>
+        </p:cxnSp>
+        <p:cxnSp>
+          <p:nvCxnSpPr>
+            <p:cNvPr id="18" name="Straight Arrow Connector 17">
+              <a:extLst>
+                <a:ext uri="{FF2B5EF4-FFF2-40B4-BE49-F238E27FC236}">
+                  <a16:creationId xmlns:a16="http://schemas.microsoft.com/office/drawing/2014/main" id="{6D54B009-9F23-416B-A9D2-47F32FDD1B54}"/>
+                </a:ext>
+              </a:extLst>
+            </p:cNvPr>
+            <p:cNvCxnSpPr>
+              <a:cxnSpLocks/>
+              <a:stCxn id="5" idx="3"/>
+              <a:endCxn id="7" idx="1"/>
+            </p:cNvCxnSpPr>
+            <p:nvPr/>
+          </p:nvCxnSpPr>
+          <p:spPr>
+            <a:xfrm>
+              <a:off x="6069874" y="3466011"/>
+              <a:ext cx="2008660" cy="1170124"/>
+            </a:xfrm>
+            <a:prstGeom prst="straightConnector1">
+              <a:avLst/>
+            </a:prstGeom>
+            <a:ln w="9525" cap="flat" cmpd="sng" algn="ctr">
+              <a:solidFill>
+                <a:schemeClr val="dk1"/>
+              </a:solidFill>
+              <a:prstDash val="solid"/>
+              <a:round/>
+              <a:headEnd type="arrow" w="med" len="med"/>
+              <a:tailEnd type="arrow" w="med" len="med"/>
+            </a:ln>
+          </p:spPr>
+          <p:style>
+            <a:lnRef idx="0">
+              <a:scrgbClr r="0" g="0" b="0"/>
+            </a:lnRef>
+            <a:fillRef idx="0">
+              <a:scrgbClr r="0" g="0" b="0"/>
+            </a:fillRef>
+            <a:effectRef idx="0">
+              <a:scrgbClr r="0" g="0" b="0"/>
+            </a:effectRef>
+            <a:fontRef idx="minor">
+              <a:schemeClr val="tx1"/>
+            </a:fontRef>
+          </p:style>
+        </p:cxnSp>
+        <p:cxnSp>
+          <p:nvCxnSpPr>
+            <p:cNvPr id="24" name="Straight Connector 23">
+              <a:extLst>
+                <a:ext uri="{FF2B5EF4-FFF2-40B4-BE49-F238E27FC236}">
+                  <a16:creationId xmlns:a16="http://schemas.microsoft.com/office/drawing/2014/main" id="{1663A26A-1FCF-4662-81D8-08A0BE68E008}"/>
+                </a:ext>
+              </a:extLst>
+            </p:cNvPr>
+            <p:cNvCxnSpPr>
+              <a:cxnSpLocks/>
+            </p:cNvCxnSpPr>
+            <p:nvPr/>
+          </p:nvCxnSpPr>
+          <p:spPr>
+            <a:xfrm>
+              <a:off x="3143794" y="121920"/>
+              <a:ext cx="0" cy="6278880"/>
+            </a:xfrm>
+            <a:prstGeom prst="line">
+              <a:avLst/>
+            </a:prstGeom>
+            <a:ln w="9525" cap="flat" cmpd="sng" algn="ctr">
+              <a:solidFill>
+                <a:schemeClr val="dk1"/>
+              </a:solidFill>
+              <a:prstDash val="dash"/>
+              <a:round/>
+              <a:headEnd type="none" w="med" len="med"/>
+              <a:tailEnd type="none" w="med" len="med"/>
+            </a:ln>
+          </p:spPr>
+          <p:style>
+            <a:lnRef idx="0">
+              <a:scrgbClr r="0" g="0" b="0"/>
+            </a:lnRef>
+            <a:fillRef idx="0">
+              <a:scrgbClr r="0" g="0" b="0"/>
+            </a:fillRef>
+            <a:effectRef idx="0">
+              <a:scrgbClr r="0" g="0" b="0"/>
+            </a:effectRef>
+            <a:fontRef idx="minor">
+              <a:schemeClr val="tx1"/>
+            </a:fontRef>
+          </p:style>
+        </p:cxnSp>
+        <p:cxnSp>
+          <p:nvCxnSpPr>
+            <p:cNvPr id="26" name="Straight Connector 25">
+              <a:extLst>
+                <a:ext uri="{FF2B5EF4-FFF2-40B4-BE49-F238E27FC236}">
+                  <a16:creationId xmlns:a16="http://schemas.microsoft.com/office/drawing/2014/main" id="{565D7042-DA60-41C1-9A48-E9F470F1DA42}"/>
+                </a:ext>
+              </a:extLst>
+            </p:cNvPr>
+            <p:cNvCxnSpPr>
+              <a:cxnSpLocks/>
+            </p:cNvCxnSpPr>
+            <p:nvPr/>
+          </p:nvCxnSpPr>
+          <p:spPr>
+            <a:xfrm>
+              <a:off x="6457405" y="121920"/>
+              <a:ext cx="0" cy="6278880"/>
+            </a:xfrm>
+            <a:prstGeom prst="line">
+              <a:avLst/>
+            </a:prstGeom>
+            <a:ln w="9525" cap="flat" cmpd="sng" algn="ctr">
+              <a:solidFill>
+                <a:schemeClr val="dk1"/>
+              </a:solidFill>
+              <a:prstDash val="dash"/>
+              <a:round/>
+              <a:headEnd type="none" w="med" len="med"/>
+              <a:tailEnd type="none" w="med" len="med"/>
+            </a:ln>
+          </p:spPr>
+          <p:style>
+            <a:lnRef idx="0">
+              <a:scrgbClr r="0" g="0" b="0"/>
+            </a:lnRef>
+            <a:fillRef idx="0">
+              <a:scrgbClr r="0" g="0" b="0"/>
+            </a:fillRef>
+            <a:effectRef idx="0">
+              <a:scrgbClr r="0" g="0" b="0"/>
+            </a:effectRef>
+            <a:fontRef idx="minor">
+              <a:schemeClr val="tx1"/>
+            </a:fontRef>
+          </p:style>
+        </p:cxnSp>
+        <p:sp>
+          <p:nvSpPr>
+            <p:cNvPr id="33" name="TextBox 32">
+              <a:extLst>
+                <a:ext uri="{FF2B5EF4-FFF2-40B4-BE49-F238E27FC236}">
+                  <a16:creationId xmlns:a16="http://schemas.microsoft.com/office/drawing/2014/main" id="{86D5140F-F427-42FA-8DAF-7F9ED8F7ACF3}"/>
+                </a:ext>
+              </a:extLst>
+            </p:cNvPr>
+            <p:cNvSpPr txBox="1"/>
+            <p:nvPr/>
+          </p:nvSpPr>
+          <p:spPr>
+            <a:xfrm>
+              <a:off x="2367117" y="1689851"/>
+              <a:ext cx="734047" cy="369332"/>
+            </a:xfrm>
+            <a:prstGeom prst="rect">
+              <a:avLst/>
+            </a:prstGeom>
+            <a:noFill/>
+          </p:spPr>
+          <p:txBody>
+            <a:bodyPr wrap="none" rtlCol="0">
+              <a:spAutoFit/>
+            </a:bodyPr>
+            <a:lstStyle/>
+            <a:p>
+              <a:r>
+                <a:rPr lang="en-SG" dirty="0"/>
+                <a:t>notify</a:t>
+              </a:r>
+            </a:p>
+          </p:txBody>
+        </p:sp>
+        <p:sp>
+          <p:nvSpPr>
+            <p:cNvPr id="34" name="TextBox 33">
+              <a:extLst>
+                <a:ext uri="{FF2B5EF4-FFF2-40B4-BE49-F238E27FC236}">
+                  <a16:creationId xmlns:a16="http://schemas.microsoft.com/office/drawing/2014/main" id="{D00E449B-041E-4734-B80F-652E137208C0}"/>
+                </a:ext>
+              </a:extLst>
+            </p:cNvPr>
+            <p:cNvSpPr txBox="1"/>
+            <p:nvPr/>
+          </p:nvSpPr>
+          <p:spPr>
+            <a:xfrm>
+              <a:off x="2294538" y="4525327"/>
+              <a:ext cx="1727845" cy="584775"/>
+            </a:xfrm>
+            <a:prstGeom prst="rect">
+              <a:avLst/>
+            </a:prstGeom>
+            <a:noFill/>
+          </p:spPr>
+          <p:txBody>
+            <a:bodyPr wrap="none" rtlCol="0">
+              <a:spAutoFit/>
+            </a:bodyPr>
+            <a:lstStyle/>
+            <a:p>
+              <a:r>
+                <a:rPr lang="en-SG" sz="1600" dirty="0"/>
+                <a:t>Inform the view to</a:t>
+              </a:r>
+            </a:p>
+            <a:p>
+              <a:r>
+                <a:rPr lang="en-SG" sz="1600" dirty="0"/>
+                <a:t>Update itself</a:t>
+              </a:r>
+            </a:p>
+          </p:txBody>
+        </p:sp>
+        <p:sp>
+          <p:nvSpPr>
+            <p:cNvPr id="35" name="TextBox 34">
+              <a:extLst>
+                <a:ext uri="{FF2B5EF4-FFF2-40B4-BE49-F238E27FC236}">
+                  <a16:creationId xmlns:a16="http://schemas.microsoft.com/office/drawing/2014/main" id="{18F19869-2A9C-4717-8A76-3FB2C4206C2F}"/>
+                </a:ext>
+              </a:extLst>
+            </p:cNvPr>
+            <p:cNvSpPr txBox="1"/>
+            <p:nvPr/>
+          </p:nvSpPr>
+          <p:spPr>
+            <a:xfrm rot="19576140">
+              <a:off x="5953390" y="2453606"/>
+              <a:ext cx="1950855" cy="307777"/>
+            </a:xfrm>
+            <a:prstGeom prst="rect">
+              <a:avLst/>
+            </a:prstGeom>
+            <a:noFill/>
+          </p:spPr>
+          <p:txBody>
+            <a:bodyPr wrap="none" rtlCol="0">
+              <a:spAutoFit/>
+            </a:bodyPr>
+            <a:lstStyle/>
+            <a:p>
+              <a:r>
+                <a:rPr lang="en-SG" sz="1400" dirty="0"/>
+                <a:t>Get data from database</a:t>
+              </a:r>
+            </a:p>
+          </p:txBody>
+        </p:sp>
+        <p:sp>
+          <p:nvSpPr>
+            <p:cNvPr id="37" name="TextBox 36">
+              <a:extLst>
+                <a:ext uri="{FF2B5EF4-FFF2-40B4-BE49-F238E27FC236}">
+                  <a16:creationId xmlns:a16="http://schemas.microsoft.com/office/drawing/2014/main" id="{63738976-B3EC-4BB8-957A-741709D5A77E}"/>
+                </a:ext>
+              </a:extLst>
+            </p:cNvPr>
+            <p:cNvSpPr txBox="1"/>
+            <p:nvPr/>
+          </p:nvSpPr>
+          <p:spPr>
+            <a:xfrm rot="1691562">
+              <a:off x="6135360" y="4124585"/>
+              <a:ext cx="2177532" cy="307777"/>
+            </a:xfrm>
+            <a:prstGeom prst="rect">
+              <a:avLst/>
+            </a:prstGeom>
+            <a:noFill/>
+          </p:spPr>
+          <p:txBody>
+            <a:bodyPr wrap="square" rtlCol="0">
+              <a:spAutoFit/>
+            </a:bodyPr>
+            <a:lstStyle/>
+            <a:p>
+              <a:r>
+                <a:rPr lang="en-SG" sz="1400" dirty="0"/>
+                <a:t>Request AWS services</a:t>
+              </a:r>
+            </a:p>
+          </p:txBody>
+        </p:sp>
+        <p:sp>
+          <p:nvSpPr>
+            <p:cNvPr id="38" name="TextBox 37">
+              <a:extLst>
+                <a:ext uri="{FF2B5EF4-FFF2-40B4-BE49-F238E27FC236}">
+                  <a16:creationId xmlns:a16="http://schemas.microsoft.com/office/drawing/2014/main" id="{0230E602-5228-4828-A820-F48DD7A09802}"/>
+                </a:ext>
+              </a:extLst>
+            </p:cNvPr>
+            <p:cNvSpPr txBox="1"/>
+            <p:nvPr/>
+          </p:nvSpPr>
+          <p:spPr>
+            <a:xfrm>
+              <a:off x="-127582" y="293264"/>
+              <a:ext cx="2786742" cy="584775"/>
+            </a:xfrm>
+            <a:prstGeom prst="rect">
+              <a:avLst/>
+            </a:prstGeom>
+            <a:noFill/>
+          </p:spPr>
+          <p:txBody>
+            <a:bodyPr wrap="square" rtlCol="0">
+              <a:spAutoFit/>
+            </a:bodyPr>
+            <a:lstStyle/>
+            <a:p>
+              <a:pPr algn="ctr"/>
+              <a:r>
+                <a:rPr lang="en-SG" sz="3200" b="1" i="1" dirty="0">
+                  <a:solidFill>
+                    <a:schemeClr val="accent1">
+                      <a:lumMod val="75000"/>
+                    </a:schemeClr>
+                  </a:solidFill>
+                </a:rPr>
+                <a:t>VIEW</a:t>
+              </a:r>
+            </a:p>
+          </p:txBody>
+        </p:sp>
+        <p:sp>
+          <p:nvSpPr>
+            <p:cNvPr id="39" name="TextBox 38">
+              <a:extLst>
+                <a:ext uri="{FF2B5EF4-FFF2-40B4-BE49-F238E27FC236}">
+                  <a16:creationId xmlns:a16="http://schemas.microsoft.com/office/drawing/2014/main" id="{D3D6B3D0-AF6C-4637-B876-550D6DE85E19}"/>
+                </a:ext>
+              </a:extLst>
+            </p:cNvPr>
+            <p:cNvSpPr txBox="1"/>
+            <p:nvPr/>
+          </p:nvSpPr>
+          <p:spPr>
+            <a:xfrm>
+              <a:off x="3476898" y="278415"/>
+              <a:ext cx="2786742" cy="584775"/>
+            </a:xfrm>
+            <a:prstGeom prst="rect">
+              <a:avLst/>
+            </a:prstGeom>
+            <a:noFill/>
+          </p:spPr>
+          <p:txBody>
+            <a:bodyPr wrap="square" rtlCol="0">
+              <a:spAutoFit/>
+            </a:bodyPr>
+            <a:lstStyle/>
+            <a:p>
+              <a:pPr algn="ctr"/>
+              <a:r>
+                <a:rPr lang="en-SG" sz="3200" b="1" i="1" dirty="0">
+                  <a:solidFill>
+                    <a:schemeClr val="accent1">
+                      <a:lumMod val="75000"/>
+                    </a:schemeClr>
+                  </a:solidFill>
+                </a:rPr>
+                <a:t>PRECENTER</a:t>
+              </a:r>
+            </a:p>
+          </p:txBody>
+        </p:sp>
+        <p:sp>
+          <p:nvSpPr>
+            <p:cNvPr id="40" name="TextBox 39">
+              <a:extLst>
+                <a:ext uri="{FF2B5EF4-FFF2-40B4-BE49-F238E27FC236}">
+                  <a16:creationId xmlns:a16="http://schemas.microsoft.com/office/drawing/2014/main" id="{4BC604E0-D03B-4595-8FAB-956F52EDC186}"/>
+                </a:ext>
+              </a:extLst>
+            </p:cNvPr>
+            <p:cNvSpPr txBox="1"/>
+            <p:nvPr/>
+          </p:nvSpPr>
+          <p:spPr>
+            <a:xfrm>
+              <a:off x="7735833" y="278415"/>
+              <a:ext cx="2786742" cy="584775"/>
+            </a:xfrm>
+            <a:prstGeom prst="rect">
+              <a:avLst/>
+            </a:prstGeom>
+            <a:noFill/>
+          </p:spPr>
+          <p:txBody>
+            <a:bodyPr wrap="square" rtlCol="0">
+              <a:spAutoFit/>
+            </a:bodyPr>
+            <a:lstStyle/>
+            <a:p>
+              <a:pPr algn="ctr"/>
+              <a:r>
+                <a:rPr lang="en-SG" sz="3200" b="1" i="1" dirty="0">
+                  <a:solidFill>
+                    <a:schemeClr val="accent1">
+                      <a:lumMod val="75000"/>
+                    </a:schemeClr>
+                  </a:solidFill>
+                </a:rPr>
+                <a:t>MODEL</a:t>
+              </a:r>
+            </a:p>
+          </p:txBody>
+        </p:sp>
+      </p:grpSp>
     </p:spTree>
     <p:extLst>
       <p:ext uri="{BB962C8B-B14F-4D97-AF65-F5344CB8AC3E}">

</xml_diff>

<commit_message>
Added System architecture design document (Final)
</commit_message>
<xml_diff>
--- a/FYP proposal V1/ArchitecutreDesign.pptx
+++ b/FYP proposal V1/ArchitecutreDesign.pptx
@@ -266,7 +266,7 @@
           <a:p>
             <a:fld id="{C3D0D60F-B766-4A36-A20F-B89224CDE8BF}" type="datetimeFigureOut">
               <a:rPr lang="en-SG" smtClean="0"/>
-              <a:t>23/8/2017</a:t>
+              <a:t>24/8/2017</a:t>
             </a:fld>
             <a:endParaRPr lang="en-SG"/>
           </a:p>
@@ -466,7 +466,7 @@
           <a:p>
             <a:fld id="{C3D0D60F-B766-4A36-A20F-B89224CDE8BF}" type="datetimeFigureOut">
               <a:rPr lang="en-SG" smtClean="0"/>
-              <a:t>23/8/2017</a:t>
+              <a:t>24/8/2017</a:t>
             </a:fld>
             <a:endParaRPr lang="en-SG"/>
           </a:p>
@@ -676,7 +676,7 @@
           <a:p>
             <a:fld id="{C3D0D60F-B766-4A36-A20F-B89224CDE8BF}" type="datetimeFigureOut">
               <a:rPr lang="en-SG" smtClean="0"/>
-              <a:t>23/8/2017</a:t>
+              <a:t>24/8/2017</a:t>
             </a:fld>
             <a:endParaRPr lang="en-SG"/>
           </a:p>
@@ -876,7 +876,7 @@
           <a:p>
             <a:fld id="{C3D0D60F-B766-4A36-A20F-B89224CDE8BF}" type="datetimeFigureOut">
               <a:rPr lang="en-SG" smtClean="0"/>
-              <a:t>23/8/2017</a:t>
+              <a:t>24/8/2017</a:t>
             </a:fld>
             <a:endParaRPr lang="en-SG"/>
           </a:p>
@@ -1152,7 +1152,7 @@
           <a:p>
             <a:fld id="{C3D0D60F-B766-4A36-A20F-B89224CDE8BF}" type="datetimeFigureOut">
               <a:rPr lang="en-SG" smtClean="0"/>
-              <a:t>23/8/2017</a:t>
+              <a:t>24/8/2017</a:t>
             </a:fld>
             <a:endParaRPr lang="en-SG"/>
           </a:p>
@@ -1420,7 +1420,7 @@
           <a:p>
             <a:fld id="{C3D0D60F-B766-4A36-A20F-B89224CDE8BF}" type="datetimeFigureOut">
               <a:rPr lang="en-SG" smtClean="0"/>
-              <a:t>23/8/2017</a:t>
+              <a:t>24/8/2017</a:t>
             </a:fld>
             <a:endParaRPr lang="en-SG"/>
           </a:p>
@@ -1835,7 +1835,7 @@
           <a:p>
             <a:fld id="{C3D0D60F-B766-4A36-A20F-B89224CDE8BF}" type="datetimeFigureOut">
               <a:rPr lang="en-SG" smtClean="0"/>
-              <a:t>23/8/2017</a:t>
+              <a:t>24/8/2017</a:t>
             </a:fld>
             <a:endParaRPr lang="en-SG"/>
           </a:p>
@@ -1977,7 +1977,7 @@
           <a:p>
             <a:fld id="{C3D0D60F-B766-4A36-A20F-B89224CDE8BF}" type="datetimeFigureOut">
               <a:rPr lang="en-SG" smtClean="0"/>
-              <a:t>23/8/2017</a:t>
+              <a:t>24/8/2017</a:t>
             </a:fld>
             <a:endParaRPr lang="en-SG"/>
           </a:p>
@@ -2090,7 +2090,7 @@
           <a:p>
             <a:fld id="{C3D0D60F-B766-4A36-A20F-B89224CDE8BF}" type="datetimeFigureOut">
               <a:rPr lang="en-SG" smtClean="0"/>
-              <a:t>23/8/2017</a:t>
+              <a:t>24/8/2017</a:t>
             </a:fld>
             <a:endParaRPr lang="en-SG"/>
           </a:p>
@@ -2403,7 +2403,7 @@
           <a:p>
             <a:fld id="{C3D0D60F-B766-4A36-A20F-B89224CDE8BF}" type="datetimeFigureOut">
               <a:rPr lang="en-SG" smtClean="0"/>
-              <a:t>23/8/2017</a:t>
+              <a:t>24/8/2017</a:t>
             </a:fld>
             <a:endParaRPr lang="en-SG"/>
           </a:p>
@@ -2692,7 +2692,7 @@
           <a:p>
             <a:fld id="{C3D0D60F-B766-4A36-A20F-B89224CDE8BF}" type="datetimeFigureOut">
               <a:rPr lang="en-SG" smtClean="0"/>
-              <a:t>23/8/2017</a:t>
+              <a:t>24/8/2017</a:t>
             </a:fld>
             <a:endParaRPr lang="en-SG"/>
           </a:p>
@@ -2935,7 +2935,7 @@
           <a:p>
             <a:fld id="{C3D0D60F-B766-4A36-A20F-B89224CDE8BF}" type="datetimeFigureOut">
               <a:rPr lang="en-SG" smtClean="0"/>
-              <a:t>23/8/2017</a:t>
+              <a:t>24/8/2017</a:t>
             </a:fld>
             <a:endParaRPr lang="en-SG"/>
           </a:p>
@@ -3483,8 +3483,8 @@
         </p:nvGrpSpPr>
         <p:grpSpPr>
           <a:xfrm>
-            <a:off x="-127582" y="121920"/>
-            <a:ext cx="10650157" cy="6278880"/>
+            <a:off x="383177" y="339634"/>
+            <a:ext cx="10600952" cy="6278880"/>
             <a:chOff x="-127582" y="121920"/>
             <a:chExt cx="10650157" cy="6278880"/>
           </a:xfrm>
@@ -3632,7 +3632,7 @@
           <p:spPr>
             <a:xfrm>
               <a:off x="8078535" y="1097280"/>
-              <a:ext cx="2101341" cy="2002971"/>
+              <a:ext cx="2283925" cy="4706982"/>
             </a:xfrm>
             <a:prstGeom prst="rect">
               <a:avLst/>
@@ -3669,66 +3669,6 @@
               <a:r>
                 <a:rPr lang="en-SG" dirty="0"/>
                 <a:t>DATABASE</a:t>
-              </a:r>
-            </a:p>
-          </p:txBody>
-        </p:sp>
-        <p:sp>
-          <p:nvSpPr>
-            <p:cNvPr id="7" name="Rectangle 6">
-              <a:extLst>
-                <a:ext uri="{FF2B5EF4-FFF2-40B4-BE49-F238E27FC236}">
-                  <a16:creationId xmlns:a16="http://schemas.microsoft.com/office/drawing/2014/main" id="{4BD83E6D-0417-4C0F-BC4B-91A79C023F64}"/>
-                </a:ext>
-              </a:extLst>
-            </p:cNvPr>
-            <p:cNvSpPr/>
-            <p:nvPr/>
-          </p:nvSpPr>
-          <p:spPr>
-            <a:xfrm>
-              <a:off x="8078534" y="3496228"/>
-              <a:ext cx="2101341" cy="2279814"/>
-            </a:xfrm>
-            <a:prstGeom prst="rect">
-              <a:avLst/>
-            </a:prstGeom>
-          </p:spPr>
-          <p:style>
-            <a:lnRef idx="2">
-              <a:schemeClr val="accent1">
-                <a:shade val="50000"/>
-              </a:schemeClr>
-            </a:lnRef>
-            <a:fillRef idx="1">
-              <a:schemeClr val="accent1"/>
-            </a:fillRef>
-            <a:effectRef idx="0">
-              <a:schemeClr val="accent1"/>
-            </a:effectRef>
-            <a:fontRef idx="minor">
-              <a:schemeClr val="lt1"/>
-            </a:fontRef>
-          </p:style>
-          <p:txBody>
-            <a:bodyPr rtlCol="0" anchor="ctr"/>
-            <a:lstStyle/>
-            <a:p>
-              <a:pPr algn="ctr"/>
-              <a:endParaRPr lang="en-SG" dirty="0"/>
-            </a:p>
-            <a:p>
-              <a:pPr algn="ctr"/>
-              <a:r>
-                <a:rPr lang="en-SG" dirty="0"/>
-                <a:t>AWS CLOUD</a:t>
-              </a:r>
-            </a:p>
-            <a:p>
-              <a:pPr algn="ctr"/>
-              <a:r>
-                <a:rPr lang="en-SG" dirty="0"/>
-                <a:t>SERVICE</a:t>
               </a:r>
             </a:p>
           </p:txBody>
@@ -3833,57 +3773,8 @@
           </p:nvCxnSpPr>
           <p:spPr>
             <a:xfrm flipV="1">
-              <a:off x="6069874" y="2098766"/>
-              <a:ext cx="2008661" cy="1367245"/>
-            </a:xfrm>
-            <a:prstGeom prst="straightConnector1">
-              <a:avLst/>
-            </a:prstGeom>
-            <a:ln w="9525" cap="flat" cmpd="sng" algn="ctr">
-              <a:solidFill>
-                <a:schemeClr val="dk1"/>
-              </a:solidFill>
-              <a:prstDash val="solid"/>
-              <a:round/>
-              <a:headEnd type="arrow" w="med" len="med"/>
-              <a:tailEnd type="arrow" w="med" len="med"/>
-            </a:ln>
-          </p:spPr>
-          <p:style>
-            <a:lnRef idx="0">
-              <a:scrgbClr r="0" g="0" b="0"/>
-            </a:lnRef>
-            <a:fillRef idx="0">
-              <a:scrgbClr r="0" g="0" b="0"/>
-            </a:fillRef>
-            <a:effectRef idx="0">
-              <a:scrgbClr r="0" g="0" b="0"/>
-            </a:effectRef>
-            <a:fontRef idx="minor">
-              <a:schemeClr val="tx1"/>
-            </a:fontRef>
-          </p:style>
-        </p:cxnSp>
-        <p:cxnSp>
-          <p:nvCxnSpPr>
-            <p:cNvPr id="18" name="Straight Arrow Connector 17">
-              <a:extLst>
-                <a:ext uri="{FF2B5EF4-FFF2-40B4-BE49-F238E27FC236}">
-                  <a16:creationId xmlns:a16="http://schemas.microsoft.com/office/drawing/2014/main" id="{6D54B009-9F23-416B-A9D2-47F32FDD1B54}"/>
-                </a:ext>
-              </a:extLst>
-            </p:cNvPr>
-            <p:cNvCxnSpPr>
-              <a:cxnSpLocks/>
-              <a:stCxn id="5" idx="3"/>
-              <a:endCxn id="7" idx="1"/>
-            </p:cNvCxnSpPr>
-            <p:nvPr/>
-          </p:nvCxnSpPr>
-          <p:spPr>
-            <a:xfrm>
-              <a:off x="6069874" y="3466011"/>
-              <a:ext cx="2008660" cy="1170124"/>
+              <a:off x="6069874" y="3450771"/>
+              <a:ext cx="2008661" cy="15240"/>
             </a:xfrm>
             <a:prstGeom prst="straightConnector1">
               <a:avLst/>
@@ -4096,8 +3987,8 @@
             <p:nvPr/>
           </p:nvSpPr>
           <p:spPr>
-            <a:xfrm rot="19576140">
-              <a:off x="5953390" y="2453606"/>
+            <a:xfrm>
+              <a:off x="6069874" y="3107471"/>
               <a:ext cx="1950855" cy="307777"/>
             </a:xfrm>
             <a:prstGeom prst="rect">
@@ -4114,41 +4005,6 @@
               <a:r>
                 <a:rPr lang="en-SG" sz="1400" dirty="0"/>
                 <a:t>Get data from database</a:t>
-              </a:r>
-            </a:p>
-          </p:txBody>
-        </p:sp>
-        <p:sp>
-          <p:nvSpPr>
-            <p:cNvPr id="37" name="TextBox 36">
-              <a:extLst>
-                <a:ext uri="{FF2B5EF4-FFF2-40B4-BE49-F238E27FC236}">
-                  <a16:creationId xmlns:a16="http://schemas.microsoft.com/office/drawing/2014/main" id="{63738976-B3EC-4BB8-957A-741709D5A77E}"/>
-                </a:ext>
-              </a:extLst>
-            </p:cNvPr>
-            <p:cNvSpPr txBox="1"/>
-            <p:nvPr/>
-          </p:nvSpPr>
-          <p:spPr>
-            <a:xfrm rot="1691562">
-              <a:off x="6135360" y="4124585"/>
-              <a:ext cx="2177532" cy="307777"/>
-            </a:xfrm>
-            <a:prstGeom prst="rect">
-              <a:avLst/>
-            </a:prstGeom>
-            <a:noFill/>
-          </p:spPr>
-          <p:txBody>
-            <a:bodyPr wrap="square" rtlCol="0">
-              <a:spAutoFit/>
-            </a:bodyPr>
-            <a:lstStyle/>
-            <a:p>
-              <a:r>
-                <a:rPr lang="en-SG" sz="1400" dirty="0"/>
-                <a:t>Request AWS services</a:t>
               </a:r>
             </a:p>
           </p:txBody>

</xml_diff>

<commit_message>
Made small changes to files
</commit_message>
<xml_diff>
--- a/FYP proposal V1/ArchitecutreDesign.pptx
+++ b/FYP proposal V1/ArchitecutreDesign.pptx
@@ -266,7 +266,7 @@
           <a:p>
             <a:fld id="{C3D0D60F-B766-4A36-A20F-B89224CDE8BF}" type="datetimeFigureOut">
               <a:rPr lang="en-SG" smtClean="0"/>
-              <a:t>24/8/2017</a:t>
+              <a:t>26/8/2017</a:t>
             </a:fld>
             <a:endParaRPr lang="en-SG"/>
           </a:p>
@@ -466,7 +466,7 @@
           <a:p>
             <a:fld id="{C3D0D60F-B766-4A36-A20F-B89224CDE8BF}" type="datetimeFigureOut">
               <a:rPr lang="en-SG" smtClean="0"/>
-              <a:t>24/8/2017</a:t>
+              <a:t>26/8/2017</a:t>
             </a:fld>
             <a:endParaRPr lang="en-SG"/>
           </a:p>
@@ -676,7 +676,7 @@
           <a:p>
             <a:fld id="{C3D0D60F-B766-4A36-A20F-B89224CDE8BF}" type="datetimeFigureOut">
               <a:rPr lang="en-SG" smtClean="0"/>
-              <a:t>24/8/2017</a:t>
+              <a:t>26/8/2017</a:t>
             </a:fld>
             <a:endParaRPr lang="en-SG"/>
           </a:p>
@@ -876,7 +876,7 @@
           <a:p>
             <a:fld id="{C3D0D60F-B766-4A36-A20F-B89224CDE8BF}" type="datetimeFigureOut">
               <a:rPr lang="en-SG" smtClean="0"/>
-              <a:t>24/8/2017</a:t>
+              <a:t>26/8/2017</a:t>
             </a:fld>
             <a:endParaRPr lang="en-SG"/>
           </a:p>
@@ -1152,7 +1152,7 @@
           <a:p>
             <a:fld id="{C3D0D60F-B766-4A36-A20F-B89224CDE8BF}" type="datetimeFigureOut">
               <a:rPr lang="en-SG" smtClean="0"/>
-              <a:t>24/8/2017</a:t>
+              <a:t>26/8/2017</a:t>
             </a:fld>
             <a:endParaRPr lang="en-SG"/>
           </a:p>
@@ -1420,7 +1420,7 @@
           <a:p>
             <a:fld id="{C3D0D60F-B766-4A36-A20F-B89224CDE8BF}" type="datetimeFigureOut">
               <a:rPr lang="en-SG" smtClean="0"/>
-              <a:t>24/8/2017</a:t>
+              <a:t>26/8/2017</a:t>
             </a:fld>
             <a:endParaRPr lang="en-SG"/>
           </a:p>
@@ -1835,7 +1835,7 @@
           <a:p>
             <a:fld id="{C3D0D60F-B766-4A36-A20F-B89224CDE8BF}" type="datetimeFigureOut">
               <a:rPr lang="en-SG" smtClean="0"/>
-              <a:t>24/8/2017</a:t>
+              <a:t>26/8/2017</a:t>
             </a:fld>
             <a:endParaRPr lang="en-SG"/>
           </a:p>
@@ -1977,7 +1977,7 @@
           <a:p>
             <a:fld id="{C3D0D60F-B766-4A36-A20F-B89224CDE8BF}" type="datetimeFigureOut">
               <a:rPr lang="en-SG" smtClean="0"/>
-              <a:t>24/8/2017</a:t>
+              <a:t>26/8/2017</a:t>
             </a:fld>
             <a:endParaRPr lang="en-SG"/>
           </a:p>
@@ -2090,7 +2090,7 @@
           <a:p>
             <a:fld id="{C3D0D60F-B766-4A36-A20F-B89224CDE8BF}" type="datetimeFigureOut">
               <a:rPr lang="en-SG" smtClean="0"/>
-              <a:t>24/8/2017</a:t>
+              <a:t>26/8/2017</a:t>
             </a:fld>
             <a:endParaRPr lang="en-SG"/>
           </a:p>
@@ -2403,7 +2403,7 @@
           <a:p>
             <a:fld id="{C3D0D60F-B766-4A36-A20F-B89224CDE8BF}" type="datetimeFigureOut">
               <a:rPr lang="en-SG" smtClean="0"/>
-              <a:t>24/8/2017</a:t>
+              <a:t>26/8/2017</a:t>
             </a:fld>
             <a:endParaRPr lang="en-SG"/>
           </a:p>
@@ -2692,7 +2692,7 @@
           <a:p>
             <a:fld id="{C3D0D60F-B766-4A36-A20F-B89224CDE8BF}" type="datetimeFigureOut">
               <a:rPr lang="en-SG" smtClean="0"/>
-              <a:t>24/8/2017</a:t>
+              <a:t>26/8/2017</a:t>
             </a:fld>
             <a:endParaRPr lang="en-SG"/>
           </a:p>
@@ -2935,7 +2935,7 @@
           <a:p>
             <a:fld id="{C3D0D60F-B766-4A36-A20F-B89224CDE8BF}" type="datetimeFigureOut">
               <a:rPr lang="en-SG" smtClean="0"/>
-              <a:t>24/8/2017</a:t>
+              <a:t>26/8/2017</a:t>
             </a:fld>
             <a:endParaRPr lang="en-SG"/>
           </a:p>
@@ -4081,15 +4081,22 @@
             <a:p>
               <a:pPr algn="ctr"/>
               <a:r>
-                <a:rPr lang="en-SG" sz="3200" b="1" i="1" dirty="0">
+                <a:rPr lang="en-SG" sz="3200" b="1" i="1">
                   <a:solidFill>
                     <a:schemeClr val="accent1">
                       <a:lumMod val="75000"/>
                     </a:schemeClr>
                   </a:solidFill>
                 </a:rPr>
-                <a:t>PRECENTER</a:t>
+                <a:t>PRESENTER</a:t>
               </a:r>
+              <a:endParaRPr lang="en-SG" sz="3200" b="1" i="1" dirty="0">
+                <a:solidFill>
+                  <a:schemeClr val="accent1">
+                    <a:lumMod val="75000"/>
+                  </a:schemeClr>
+                </a:solidFill>
+              </a:endParaRPr>
             </a:p>
           </p:txBody>
         </p:sp>

</xml_diff>